<commit_message>
04042024 PhD presentations update
</commit_message>
<xml_diff>
--- a/2023-2024/Website pic standardization.pptx
+++ b/2023-2024/Website pic standardization.pptx
@@ -9,6 +9,7 @@
     <p:sldId id="257" r:id="rId3"/>
     <p:sldId id="258" r:id="rId4"/>
     <p:sldId id="259" r:id="rId5"/>
+    <p:sldId id="260" r:id="rId6"/>
   </p:sldIdLst>
   <p:sldSz cx="12192000" cy="6858000"/>
   <p:notesSz cx="6858000" cy="9144000"/>
@@ -275,7 +276,7 @@
           <a:p>
             <a:fld id="{AED78EE6-7C35-42AA-BCAB-EACF262A9D8B}" type="datetimeFigureOut">
               <a:rPr lang="nl-NL" smtClean="0"/>
-              <a:t>15-3-2024</a:t>
+              <a:t>3-4-2024</a:t>
             </a:fld>
             <a:endParaRPr lang="nl-NL"/>
           </a:p>
@@ -475,7 +476,7 @@
           <a:p>
             <a:fld id="{AED78EE6-7C35-42AA-BCAB-EACF262A9D8B}" type="datetimeFigureOut">
               <a:rPr lang="nl-NL" smtClean="0"/>
-              <a:t>15-3-2024</a:t>
+              <a:t>3-4-2024</a:t>
             </a:fld>
             <a:endParaRPr lang="nl-NL"/>
           </a:p>
@@ -685,7 +686,7 @@
           <a:p>
             <a:fld id="{AED78EE6-7C35-42AA-BCAB-EACF262A9D8B}" type="datetimeFigureOut">
               <a:rPr lang="nl-NL" smtClean="0"/>
-              <a:t>15-3-2024</a:t>
+              <a:t>3-4-2024</a:t>
             </a:fld>
             <a:endParaRPr lang="nl-NL"/>
           </a:p>
@@ -885,7 +886,7 @@
           <a:p>
             <a:fld id="{AED78EE6-7C35-42AA-BCAB-EACF262A9D8B}" type="datetimeFigureOut">
               <a:rPr lang="nl-NL" smtClean="0"/>
-              <a:t>15-3-2024</a:t>
+              <a:t>3-4-2024</a:t>
             </a:fld>
             <a:endParaRPr lang="nl-NL"/>
           </a:p>
@@ -1161,7 +1162,7 @@
           <a:p>
             <a:fld id="{AED78EE6-7C35-42AA-BCAB-EACF262A9D8B}" type="datetimeFigureOut">
               <a:rPr lang="nl-NL" smtClean="0"/>
-              <a:t>15-3-2024</a:t>
+              <a:t>3-4-2024</a:t>
             </a:fld>
             <a:endParaRPr lang="nl-NL"/>
           </a:p>
@@ -1429,7 +1430,7 @@
           <a:p>
             <a:fld id="{AED78EE6-7C35-42AA-BCAB-EACF262A9D8B}" type="datetimeFigureOut">
               <a:rPr lang="nl-NL" smtClean="0"/>
-              <a:t>15-3-2024</a:t>
+              <a:t>3-4-2024</a:t>
             </a:fld>
             <a:endParaRPr lang="nl-NL"/>
           </a:p>
@@ -1844,7 +1845,7 @@
           <a:p>
             <a:fld id="{AED78EE6-7C35-42AA-BCAB-EACF262A9D8B}" type="datetimeFigureOut">
               <a:rPr lang="nl-NL" smtClean="0"/>
-              <a:t>15-3-2024</a:t>
+              <a:t>3-4-2024</a:t>
             </a:fld>
             <a:endParaRPr lang="nl-NL"/>
           </a:p>
@@ -1986,7 +1987,7 @@
           <a:p>
             <a:fld id="{AED78EE6-7C35-42AA-BCAB-EACF262A9D8B}" type="datetimeFigureOut">
               <a:rPr lang="nl-NL" smtClean="0"/>
-              <a:t>15-3-2024</a:t>
+              <a:t>3-4-2024</a:t>
             </a:fld>
             <a:endParaRPr lang="nl-NL"/>
           </a:p>
@@ -2099,7 +2100,7 @@
           <a:p>
             <a:fld id="{AED78EE6-7C35-42AA-BCAB-EACF262A9D8B}" type="datetimeFigureOut">
               <a:rPr lang="nl-NL" smtClean="0"/>
-              <a:t>15-3-2024</a:t>
+              <a:t>3-4-2024</a:t>
             </a:fld>
             <a:endParaRPr lang="nl-NL"/>
           </a:p>
@@ -2412,7 +2413,7 @@
           <a:p>
             <a:fld id="{AED78EE6-7C35-42AA-BCAB-EACF262A9D8B}" type="datetimeFigureOut">
               <a:rPr lang="nl-NL" smtClean="0"/>
-              <a:t>15-3-2024</a:t>
+              <a:t>3-4-2024</a:t>
             </a:fld>
             <a:endParaRPr lang="nl-NL"/>
           </a:p>
@@ -2701,7 +2702,7 @@
           <a:p>
             <a:fld id="{AED78EE6-7C35-42AA-BCAB-EACF262A9D8B}" type="datetimeFigureOut">
               <a:rPr lang="nl-NL" smtClean="0"/>
-              <a:t>15-3-2024</a:t>
+              <a:t>3-4-2024</a:t>
             </a:fld>
             <a:endParaRPr lang="nl-NL"/>
           </a:p>
@@ -2944,7 +2945,7 @@
           <a:p>
             <a:fld id="{AED78EE6-7C35-42AA-BCAB-EACF262A9D8B}" type="datetimeFigureOut">
               <a:rPr lang="nl-NL" smtClean="0"/>
-              <a:t>15-3-2024</a:t>
+              <a:t>3-4-2024</a:t>
             </a:fld>
             <a:endParaRPr lang="nl-NL"/>
           </a:p>
@@ -4849,6 +4850,736 @@
 </p:sld>
 </file>
 
+<file path=ppt/slides/slide5.xml><?xml version="1.0" encoding="utf-8"?>
+<p:sld xmlns:a="http://schemas.openxmlformats.org/drawingml/2006/main" xmlns:r="http://schemas.openxmlformats.org/officeDocument/2006/relationships" xmlns:p="http://schemas.openxmlformats.org/presentationml/2006/main">
+  <p:cSld>
+    <p:spTree>
+      <p:nvGrpSpPr>
+        <p:cNvPr id="1" name="">
+          <a:extLst>
+            <a:ext uri="{FF2B5EF4-FFF2-40B4-BE49-F238E27FC236}">
+              <a16:creationId xmlns:a16="http://schemas.microsoft.com/office/drawing/2014/main" id="{7BB5F87C-3AD6-3715-C424-CD5F823BB645}"/>
+            </a:ext>
+          </a:extLst>
+        </p:cNvPr>
+        <p:cNvGrpSpPr/>
+        <p:nvPr/>
+      </p:nvGrpSpPr>
+      <p:grpSpPr>
+        <a:xfrm>
+          <a:off x="0" y="0"/>
+          <a:ext cx="0" cy="0"/>
+          <a:chOff x="0" y="0"/>
+          <a:chExt cx="0" cy="0"/>
+        </a:xfrm>
+      </p:grpSpPr>
+      <p:sp>
+        <p:nvSpPr>
+          <p:cNvPr id="7" name="CasellaDiTesto 6">
+            <a:extLst>
+              <a:ext uri="{FF2B5EF4-FFF2-40B4-BE49-F238E27FC236}">
+                <a16:creationId xmlns:a16="http://schemas.microsoft.com/office/drawing/2014/main" id="{8663F90B-E38D-4586-1BE9-BC40114E1165}"/>
+              </a:ext>
+            </a:extLst>
+          </p:cNvPr>
+          <p:cNvSpPr txBox="1"/>
+          <p:nvPr/>
+        </p:nvSpPr>
+        <p:spPr>
+          <a:xfrm>
+            <a:off x="1813559" y="11631"/>
+            <a:ext cx="2430780" cy="369332"/>
+          </a:xfrm>
+          <a:prstGeom prst="rect">
+            <a:avLst/>
+          </a:prstGeom>
+          <a:noFill/>
+        </p:spPr>
+        <p:txBody>
+          <a:bodyPr wrap="square" rtlCol="0">
+            <a:spAutoFit/>
+          </a:bodyPr>
+          <a:lstStyle/>
+          <a:p>
+            <a:pPr algn="ctr"/>
+            <a:r>
+              <a:rPr lang="nl-NL" dirty="0"/>
+              <a:t>20240404_Matthis</a:t>
+            </a:r>
+          </a:p>
+        </p:txBody>
+      </p:sp>
+      <p:sp>
+        <p:nvSpPr>
+          <p:cNvPr id="12" name="CasellaDiTesto 11">
+            <a:extLst>
+              <a:ext uri="{FF2B5EF4-FFF2-40B4-BE49-F238E27FC236}">
+                <a16:creationId xmlns:a16="http://schemas.microsoft.com/office/drawing/2014/main" id="{68406072-AA2B-689B-6562-EFC960186FEF}"/>
+              </a:ext>
+            </a:extLst>
+          </p:cNvPr>
+          <p:cNvSpPr txBox="1"/>
+          <p:nvPr/>
+        </p:nvSpPr>
+        <p:spPr>
+          <a:xfrm>
+            <a:off x="7947661" y="12784"/>
+            <a:ext cx="2430780" cy="369332"/>
+          </a:xfrm>
+          <a:prstGeom prst="rect">
+            <a:avLst/>
+          </a:prstGeom>
+          <a:noFill/>
+        </p:spPr>
+        <p:txBody>
+          <a:bodyPr wrap="square" rtlCol="0">
+            <a:spAutoFit/>
+          </a:bodyPr>
+          <a:lstStyle/>
+          <a:p>
+            <a:pPr algn="ctr"/>
+            <a:r>
+              <a:rPr lang="nl-NL" dirty="0"/>
+              <a:t>20240404_Wieger</a:t>
+            </a:r>
+          </a:p>
+        </p:txBody>
+      </p:sp>
+      <p:sp>
+        <p:nvSpPr>
+          <p:cNvPr id="13" name="CasellaDiTesto 12">
+            <a:extLst>
+              <a:ext uri="{FF2B5EF4-FFF2-40B4-BE49-F238E27FC236}">
+                <a16:creationId xmlns:a16="http://schemas.microsoft.com/office/drawing/2014/main" id="{5E620CD6-1D48-EF8B-7BE7-47965360328C}"/>
+              </a:ext>
+            </a:extLst>
+          </p:cNvPr>
+          <p:cNvSpPr txBox="1"/>
+          <p:nvPr/>
+        </p:nvSpPr>
+        <p:spPr>
+          <a:xfrm>
+            <a:off x="116549" y="4095786"/>
+            <a:ext cx="5824800" cy="461665"/>
+          </a:xfrm>
+          <a:prstGeom prst="rect">
+            <a:avLst/>
+          </a:prstGeom>
+          <a:noFill/>
+        </p:spPr>
+        <p:txBody>
+          <a:bodyPr wrap="square" rtlCol="0">
+            <a:spAutoFit/>
+          </a:bodyPr>
+          <a:lstStyle/>
+          <a:p>
+            <a:r>
+              <a:rPr lang="en-US" sz="1200" b="1" dirty="0"/>
+              <a:t>Thermal Stress-Aware Power Modulation for Solid Oxide Fuel Cell Systems through Model Predictive Control </a:t>
+            </a:r>
+            <a:r>
+              <a:rPr lang="nl-NL" sz="1200" b="1" dirty="0"/>
+              <a:t>- Matthis de Lange</a:t>
+            </a:r>
+          </a:p>
+        </p:txBody>
+      </p:sp>
+      <p:sp>
+        <p:nvSpPr>
+          <p:cNvPr id="14" name="CasellaDiTesto 13">
+            <a:extLst>
+              <a:ext uri="{FF2B5EF4-FFF2-40B4-BE49-F238E27FC236}">
+                <a16:creationId xmlns:a16="http://schemas.microsoft.com/office/drawing/2014/main" id="{F9E9044F-C669-8338-0DFE-A075DBF4A194}"/>
+              </a:ext>
+            </a:extLst>
+          </p:cNvPr>
+          <p:cNvSpPr txBox="1"/>
+          <p:nvPr/>
+        </p:nvSpPr>
+        <p:spPr>
+          <a:xfrm>
+            <a:off x="6250651" y="4095786"/>
+            <a:ext cx="5824800" cy="461665"/>
+          </a:xfrm>
+          <a:prstGeom prst="rect">
+            <a:avLst/>
+          </a:prstGeom>
+          <a:noFill/>
+        </p:spPr>
+        <p:txBody>
+          <a:bodyPr wrap="square" rtlCol="0">
+            <a:spAutoFit/>
+          </a:bodyPr>
+          <a:lstStyle/>
+          <a:p>
+            <a:r>
+              <a:rPr lang="en-US" sz="1200" b="1" dirty="0">
+                <a:effectLst/>
+                <a:latin typeface="Calibri" panose="020F0502020204030204" pitchFamily="34" charset="0"/>
+                <a:ea typeface="Calibri" panose="020F0502020204030204" pitchFamily="34" charset="0"/>
+              </a:rPr>
+              <a:t>Ship based carbon capture systems – The LNG-Zero project</a:t>
+            </a:r>
+            <a:endParaRPr lang="en-GB" sz="1200" b="1" dirty="0">
+              <a:effectLst/>
+              <a:latin typeface="Calibri" panose="020F0502020204030204" pitchFamily="34" charset="0"/>
+              <a:ea typeface="Calibri" panose="020F0502020204030204" pitchFamily="34" charset="0"/>
+            </a:endParaRPr>
+          </a:p>
+          <a:p>
+            <a:r>
+              <a:rPr lang="fi-FI" sz="1200" b="1" dirty="0"/>
+              <a:t>Wieger Peet</a:t>
+            </a:r>
+            <a:endParaRPr lang="nl-NL" sz="1200" b="1" dirty="0"/>
+          </a:p>
+        </p:txBody>
+      </p:sp>
+      <p:sp>
+        <p:nvSpPr>
+          <p:cNvPr id="16" name="CasellaDiTesto 15">
+            <a:extLst>
+              <a:ext uri="{FF2B5EF4-FFF2-40B4-BE49-F238E27FC236}">
+                <a16:creationId xmlns:a16="http://schemas.microsoft.com/office/drawing/2014/main" id="{D7A53153-4C88-9AA2-043D-A589EDFE79BE}"/>
+              </a:ext>
+            </a:extLst>
+          </p:cNvPr>
+          <p:cNvSpPr txBox="1"/>
+          <p:nvPr/>
+        </p:nvSpPr>
+        <p:spPr>
+          <a:xfrm>
+            <a:off x="6250651" y="4559674"/>
+            <a:ext cx="5824800" cy="1338828"/>
+          </a:xfrm>
+          <a:prstGeom prst="rect">
+            <a:avLst/>
+          </a:prstGeom>
+          <a:noFill/>
+        </p:spPr>
+        <p:txBody>
+          <a:bodyPr wrap="square" rtlCol="0">
+            <a:spAutoFit/>
+          </a:bodyPr>
+          <a:lstStyle/>
+          <a:p>
+            <a:pPr algn="just"/>
+            <a:r>
+              <a:rPr lang="en-US" sz="900" dirty="0">
+                <a:effectLst/>
+                <a:latin typeface="Calibri" panose="020F0502020204030204" pitchFamily="34" charset="0"/>
+                <a:ea typeface="Times New Roman" panose="02020603050405020304" pitchFamily="18" charset="0"/>
+                <a:cs typeface="Arial" panose="020B0604020202020204" pitchFamily="34" charset="0"/>
+              </a:rPr>
+              <a:t>The importance of reducing the harmful emissions from vessel is clear. But in order to reach the goals set by the IMO we need to come up with new solutions. LNG-Zero is an ambitious research project that aims to develop technologies and strategies to drastically reduce the emissions from LNG powered vessels, making the shipping industry more sustainable. The main focus of the LNG-Zero project is on accelerating a novel technology for reducing the GHG emissions and NOx on LNG </a:t>
+            </a:r>
+            <a:r>
+              <a:rPr lang="en-US" sz="900" dirty="0" err="1">
+                <a:effectLst/>
+                <a:latin typeface="Calibri" panose="020F0502020204030204" pitchFamily="34" charset="0"/>
+                <a:ea typeface="Times New Roman" panose="02020603050405020304" pitchFamily="18" charset="0"/>
+                <a:cs typeface="Arial" panose="020B0604020202020204" pitchFamily="34" charset="0"/>
+              </a:rPr>
+              <a:t>fuelled</a:t>
+            </a:r>
+            <a:r>
+              <a:rPr lang="en-US" sz="900" dirty="0">
+                <a:effectLst/>
+                <a:latin typeface="Calibri" panose="020F0502020204030204" pitchFamily="34" charset="0"/>
+                <a:ea typeface="Times New Roman" panose="02020603050405020304" pitchFamily="18" charset="0"/>
+                <a:cs typeface="Arial" panose="020B0604020202020204" pitchFamily="34" charset="0"/>
+              </a:rPr>
+              <a:t> vessels. In order to reach the low levels of emissions set in this project, a comprehensive cleaning step of the exhaust gas has to be performed.</a:t>
+            </a:r>
+          </a:p>
+          <a:p>
+            <a:pPr algn="just"/>
+            <a:r>
+              <a:rPr lang="en-US" sz="900" dirty="0">
+                <a:effectLst/>
+                <a:latin typeface="Calibri" panose="020F0502020204030204" pitchFamily="34" charset="0"/>
+                <a:ea typeface="Times New Roman" panose="02020603050405020304" pitchFamily="18" charset="0"/>
+                <a:cs typeface="Arial" panose="020B0604020202020204" pitchFamily="34" charset="0"/>
+              </a:rPr>
+              <a:t>During my presentation I will tell more about the goals of the project, the technologies that are being used/developed and what we are doing to support the project.</a:t>
+            </a:r>
+          </a:p>
+          <a:p>
+            <a:pPr algn="just"/>
+            <a:endParaRPr lang="nl-NL" sz="900" dirty="0">
+              <a:effectLst/>
+              <a:latin typeface="Times New Roman" panose="02020603050405020304" pitchFamily="18" charset="0"/>
+              <a:ea typeface="Times New Roman" panose="02020603050405020304" pitchFamily="18" charset="0"/>
+            </a:endParaRPr>
+          </a:p>
+        </p:txBody>
+      </p:sp>
+      <p:sp>
+        <p:nvSpPr>
+          <p:cNvPr id="17" name="CasellaDiTesto 16">
+            <a:extLst>
+              <a:ext uri="{FF2B5EF4-FFF2-40B4-BE49-F238E27FC236}">
+                <a16:creationId xmlns:a16="http://schemas.microsoft.com/office/drawing/2014/main" id="{618E04E6-4D3E-BA2E-DFB3-DC2A761BC1DF}"/>
+              </a:ext>
+            </a:extLst>
+          </p:cNvPr>
+          <p:cNvSpPr txBox="1"/>
+          <p:nvPr/>
+        </p:nvSpPr>
+        <p:spPr>
+          <a:xfrm>
+            <a:off x="116549" y="4559674"/>
+            <a:ext cx="5824800" cy="1477328"/>
+          </a:xfrm>
+          <a:prstGeom prst="rect">
+            <a:avLst/>
+          </a:prstGeom>
+          <a:noFill/>
+        </p:spPr>
+        <p:txBody>
+          <a:bodyPr wrap="square" rtlCol="0">
+            <a:spAutoFit/>
+          </a:bodyPr>
+          <a:lstStyle/>
+          <a:p>
+            <a:pPr algn="just"/>
+            <a:r>
+              <a:rPr lang="en-US" sz="900" dirty="0">
+                <a:effectLst/>
+                <a:latin typeface="Calibri" panose="020F0502020204030204" pitchFamily="34" charset="0"/>
+                <a:ea typeface="Times New Roman" panose="02020603050405020304" pitchFamily="18" charset="0"/>
+                <a:cs typeface="Arial" panose="020B0604020202020204" pitchFamily="34" charset="0"/>
+              </a:rPr>
+              <a:t>To mitigate polluting emissions in the maritime sector, Solid Oxide Fuel Cells (SOFC) are being explored as alternative power sources for vessels as they offer improved fuel conversion efficiency and reduced emissions. However, SOFCs encounter challenges related to slow power regulation, due to implicit constraints imposed by the need to limit thermal stress in the cells. Thermal stress can potentially damage the cell stack, thus efficient and safe control strategies are essential for the successful integration of SOFCs onboard a vessel. In previous research, these implicit constraints restrict the power modulation either by restricting the power reference or via a rate limit on the electrical current. In this research, we propose to address this explicitly by integrating thermal stress considerations, specifically spatial temperature gradients, into the control strategy using a Model Predictive Control (MPC) approach. This allows us to dynamically regulate the SOFC within the spatial temperature gradient constraints, enhancing the SOFC’s ability to track a time-varying power demand.</a:t>
+            </a:r>
+            <a:endParaRPr lang="nl-NL" sz="900" dirty="0">
+              <a:effectLst/>
+              <a:latin typeface="Times New Roman" panose="02020603050405020304" pitchFamily="18" charset="0"/>
+              <a:ea typeface="Times New Roman" panose="02020603050405020304" pitchFamily="18" charset="0"/>
+            </a:endParaRPr>
+          </a:p>
+        </p:txBody>
+      </p:sp>
+      <p:grpSp>
+        <p:nvGrpSpPr>
+          <p:cNvPr id="2048" name="Gruppo 2047">
+            <a:extLst>
+              <a:ext uri="{FF2B5EF4-FFF2-40B4-BE49-F238E27FC236}">
+                <a16:creationId xmlns:a16="http://schemas.microsoft.com/office/drawing/2014/main" id="{82323FF3-4DF8-E7D7-BC60-4CF2EED1009E}"/>
+              </a:ext>
+            </a:extLst>
+          </p:cNvPr>
+          <p:cNvGrpSpPr/>
+          <p:nvPr/>
+        </p:nvGrpSpPr>
+        <p:grpSpPr>
+          <a:xfrm>
+            <a:off x="116550" y="371901"/>
+            <a:ext cx="5824800" cy="3600000"/>
+            <a:chOff x="116550" y="371901"/>
+            <a:chExt cx="5824800" cy="3600000"/>
+          </a:xfrm>
+        </p:grpSpPr>
+        <p:sp>
+          <p:nvSpPr>
+            <p:cNvPr id="63" name="Rettangolo 62">
+              <a:extLst>
+                <a:ext uri="{FF2B5EF4-FFF2-40B4-BE49-F238E27FC236}">
+                  <a16:creationId xmlns:a16="http://schemas.microsoft.com/office/drawing/2014/main" id="{F603F769-EBBC-C7FD-49F6-94A5A15E9B2A}"/>
+                </a:ext>
+              </a:extLst>
+            </p:cNvPr>
+            <p:cNvSpPr/>
+            <p:nvPr/>
+          </p:nvSpPr>
+          <p:spPr>
+            <a:xfrm>
+              <a:off x="116550" y="371901"/>
+              <a:ext cx="5824800" cy="3600000"/>
+            </a:xfrm>
+            <a:prstGeom prst="rect">
+              <a:avLst/>
+            </a:prstGeom>
+            <a:gradFill>
+              <a:gsLst>
+                <a:gs pos="17000">
+                  <a:srgbClr val="DAFFFF"/>
+                </a:gs>
+                <a:gs pos="100000">
+                  <a:srgbClr val="FFFFFF"/>
+                </a:gs>
+              </a:gsLst>
+              <a:lin ang="5400000" scaled="0"/>
+            </a:gradFill>
+            <a:ln w="9525">
+              <a:noFill/>
+            </a:ln>
+          </p:spPr>
+          <p:style>
+            <a:lnRef idx="2">
+              <a:schemeClr val="accent1">
+                <a:shade val="15000"/>
+              </a:schemeClr>
+            </a:lnRef>
+            <a:fillRef idx="1">
+              <a:schemeClr val="accent1"/>
+            </a:fillRef>
+            <a:effectRef idx="0">
+              <a:schemeClr val="accent1"/>
+            </a:effectRef>
+            <a:fontRef idx="minor">
+              <a:schemeClr val="lt1"/>
+            </a:fontRef>
+          </p:style>
+          <p:txBody>
+            <a:bodyPr rtlCol="0" anchor="ctr"/>
+            <a:lstStyle/>
+            <a:p>
+              <a:pPr algn="ctr"/>
+              <a:endParaRPr lang="nl-NL" dirty="0"/>
+            </a:p>
+          </p:txBody>
+        </p:sp>
+        <p:pic>
+          <p:nvPicPr>
+            <p:cNvPr id="61" name="Immagine 60">
+              <a:extLst>
+                <a:ext uri="{FF2B5EF4-FFF2-40B4-BE49-F238E27FC236}">
+                  <a16:creationId xmlns:a16="http://schemas.microsoft.com/office/drawing/2014/main" id="{ED5886C2-C7BD-9341-FF3C-10E48719FC27}"/>
+                </a:ext>
+              </a:extLst>
+            </p:cNvPr>
+            <p:cNvPicPr>
+              <a:picLocks noChangeAspect="1"/>
+            </p:cNvPicPr>
+            <p:nvPr/>
+          </p:nvPicPr>
+          <p:blipFill>
+            <a:blip r:embed="rId2"/>
+            <a:stretch>
+              <a:fillRect/>
+            </a:stretch>
+          </p:blipFill>
+          <p:spPr>
+            <a:xfrm>
+              <a:off x="899372" y="438172"/>
+              <a:ext cx="4266988" cy="3454024"/>
+            </a:xfrm>
+            <a:prstGeom prst="rect">
+              <a:avLst/>
+            </a:prstGeom>
+          </p:spPr>
+        </p:pic>
+      </p:grpSp>
+      <p:grpSp>
+        <p:nvGrpSpPr>
+          <p:cNvPr id="19" name="Gruppo 18">
+            <a:extLst>
+              <a:ext uri="{FF2B5EF4-FFF2-40B4-BE49-F238E27FC236}">
+                <a16:creationId xmlns:a16="http://schemas.microsoft.com/office/drawing/2014/main" id="{7AE50D5A-78BD-9B57-E645-D68EC2C1656E}"/>
+              </a:ext>
+            </a:extLst>
+          </p:cNvPr>
+          <p:cNvGrpSpPr/>
+          <p:nvPr/>
+        </p:nvGrpSpPr>
+        <p:grpSpPr>
+          <a:xfrm>
+            <a:off x="6250651" y="371498"/>
+            <a:ext cx="5825133" cy="3600000"/>
+            <a:chOff x="6250651" y="371498"/>
+            <a:chExt cx="5825133" cy="3600000"/>
+          </a:xfrm>
+        </p:grpSpPr>
+        <p:sp>
+          <p:nvSpPr>
+            <p:cNvPr id="10" name="Rettangolo 9">
+              <a:extLst>
+                <a:ext uri="{FF2B5EF4-FFF2-40B4-BE49-F238E27FC236}">
+                  <a16:creationId xmlns:a16="http://schemas.microsoft.com/office/drawing/2014/main" id="{1E0C9BC2-CEB2-DCD9-FBD1-EE736FAAE530}"/>
+                </a:ext>
+              </a:extLst>
+            </p:cNvPr>
+            <p:cNvSpPr/>
+            <p:nvPr/>
+          </p:nvSpPr>
+          <p:spPr>
+            <a:xfrm>
+              <a:off x="6250652" y="371498"/>
+              <a:ext cx="5824800" cy="3600000"/>
+            </a:xfrm>
+            <a:prstGeom prst="rect">
+              <a:avLst/>
+            </a:prstGeom>
+            <a:gradFill>
+              <a:gsLst>
+                <a:gs pos="0">
+                  <a:srgbClr val="004653"/>
+                </a:gs>
+                <a:gs pos="100000">
+                  <a:srgbClr val="134B6A"/>
+                </a:gs>
+              </a:gsLst>
+              <a:lin ang="16200000" scaled="0"/>
+            </a:gradFill>
+            <a:ln w="9525">
+              <a:noFill/>
+            </a:ln>
+          </p:spPr>
+          <p:style>
+            <a:lnRef idx="2">
+              <a:schemeClr val="accent1">
+                <a:shade val="15000"/>
+              </a:schemeClr>
+            </a:lnRef>
+            <a:fillRef idx="1">
+              <a:schemeClr val="accent1"/>
+            </a:fillRef>
+            <a:effectRef idx="0">
+              <a:schemeClr val="accent1"/>
+            </a:effectRef>
+            <a:fontRef idx="minor">
+              <a:schemeClr val="lt1"/>
+            </a:fontRef>
+          </p:style>
+          <p:txBody>
+            <a:bodyPr rtlCol="0" anchor="ctr"/>
+            <a:lstStyle/>
+            <a:p>
+              <a:pPr algn="ctr"/>
+              <a:endParaRPr lang="nl-NL" dirty="0"/>
+            </a:p>
+          </p:txBody>
+        </p:sp>
+        <p:grpSp>
+          <p:nvGrpSpPr>
+            <p:cNvPr id="8" name="Gruppo 7">
+              <a:extLst>
+                <a:ext uri="{FF2B5EF4-FFF2-40B4-BE49-F238E27FC236}">
+                  <a16:creationId xmlns:a16="http://schemas.microsoft.com/office/drawing/2014/main" id="{5D6163A6-1608-9667-0699-D61887B333BA}"/>
+                </a:ext>
+              </a:extLst>
+            </p:cNvPr>
+            <p:cNvGrpSpPr>
+              <a:grpSpLocks noChangeAspect="1"/>
+            </p:cNvGrpSpPr>
+            <p:nvPr/>
+          </p:nvGrpSpPr>
+          <p:grpSpPr>
+            <a:xfrm>
+              <a:off x="6250651" y="538488"/>
+              <a:ext cx="5825133" cy="3276637"/>
+              <a:chOff x="1905875" y="1072055"/>
+              <a:chExt cx="8380249" cy="4713890"/>
+            </a:xfrm>
+          </p:grpSpPr>
+          <p:pic>
+            <p:nvPicPr>
+              <p:cNvPr id="9" name="Picture 2" descr="Home - LNG-ZERO project">
+                <a:extLst>
+                  <a:ext uri="{FF2B5EF4-FFF2-40B4-BE49-F238E27FC236}">
+                    <a16:creationId xmlns:a16="http://schemas.microsoft.com/office/drawing/2014/main" id="{4D79E38C-CE7D-501B-6B00-F7287D16B0DA}"/>
+                  </a:ext>
+                </a:extLst>
+              </p:cNvPr>
+              <p:cNvPicPr>
+                <a:picLocks noChangeAspect="1" noChangeArrowheads="1"/>
+              </p:cNvPicPr>
+              <p:nvPr/>
+            </p:nvPicPr>
+            <p:blipFill>
+              <a:blip r:embed="rId3">
+                <a:extLst>
+                  <a:ext uri="{28A0092B-C50C-407E-A947-70E740481C1C}">
+                    <a14:useLocalDpi xmlns:a14="http://schemas.microsoft.com/office/drawing/2010/main" val="0"/>
+                  </a:ext>
+                </a:extLst>
+              </a:blip>
+              <a:srcRect/>
+              <a:stretch>
+                <a:fillRect/>
+              </a:stretch>
+            </p:blipFill>
+            <p:spPr bwMode="auto">
+              <a:xfrm>
+                <a:off x="1905875" y="1072055"/>
+                <a:ext cx="8380249" cy="4713890"/>
+              </a:xfrm>
+              <a:prstGeom prst="rect">
+                <a:avLst/>
+              </a:prstGeom>
+              <a:noFill/>
+              <a:extLst>
+                <a:ext uri="{909E8E84-426E-40DD-AFC4-6F175D3DCCD1}">
+                  <a14:hiddenFill xmlns:a14="http://schemas.microsoft.com/office/drawing/2010/main">
+                    <a:solidFill>
+                      <a:srgbClr val="FFFFFF"/>
+                    </a:solidFill>
+                  </a14:hiddenFill>
+                </a:ext>
+              </a:extLst>
+            </p:spPr>
+          </p:pic>
+          <p:grpSp>
+            <p:nvGrpSpPr>
+              <p:cNvPr id="11" name="Gruppo 10">
+                <a:extLst>
+                  <a:ext uri="{FF2B5EF4-FFF2-40B4-BE49-F238E27FC236}">
+                    <a16:creationId xmlns:a16="http://schemas.microsoft.com/office/drawing/2014/main" id="{EAA736DD-B355-5D1A-44B2-2CE41B9EFE3E}"/>
+                  </a:ext>
+                </a:extLst>
+              </p:cNvPr>
+              <p:cNvGrpSpPr/>
+              <p:nvPr/>
+            </p:nvGrpSpPr>
+            <p:grpSpPr>
+              <a:xfrm>
+                <a:off x="8243613" y="3713326"/>
+                <a:ext cx="1936750" cy="1974850"/>
+                <a:chOff x="1905875" y="1072055"/>
+                <a:chExt cx="1936750" cy="1974850"/>
+              </a:xfrm>
+            </p:grpSpPr>
+            <p:sp>
+              <p:nvSpPr>
+                <p:cNvPr id="15" name="Rettangolo 14">
+                  <a:extLst>
+                    <a:ext uri="{FF2B5EF4-FFF2-40B4-BE49-F238E27FC236}">
+                      <a16:creationId xmlns:a16="http://schemas.microsoft.com/office/drawing/2014/main" id="{B6F38E01-775A-0384-62DD-CA38BC4453B3}"/>
+                    </a:ext>
+                  </a:extLst>
+                </p:cNvPr>
+                <p:cNvSpPr/>
+                <p:nvPr/>
+              </p:nvSpPr>
+              <p:spPr>
+                <a:xfrm>
+                  <a:off x="1905875" y="1072055"/>
+                  <a:ext cx="1936750" cy="1974850"/>
+                </a:xfrm>
+                <a:prstGeom prst="rect">
+                  <a:avLst/>
+                </a:prstGeom>
+                <a:solidFill>
+                  <a:schemeClr val="bg1">
+                    <a:alpha val="73000"/>
+                  </a:schemeClr>
+                </a:solidFill>
+                <a:ln>
+                  <a:noFill/>
+                </a:ln>
+              </p:spPr>
+              <p:style>
+                <a:lnRef idx="2">
+                  <a:schemeClr val="accent1">
+                    <a:shade val="15000"/>
+                  </a:schemeClr>
+                </a:lnRef>
+                <a:fillRef idx="1">
+                  <a:schemeClr val="accent1"/>
+                </a:fillRef>
+                <a:effectRef idx="0">
+                  <a:schemeClr val="accent1"/>
+                </a:effectRef>
+                <a:fontRef idx="minor">
+                  <a:schemeClr val="lt1"/>
+                </a:fontRef>
+              </p:style>
+              <p:txBody>
+                <a:bodyPr rtlCol="0" anchor="ctr"/>
+                <a:lstStyle/>
+                <a:p>
+                  <a:pPr algn="ctr"/>
+                  <a:endParaRPr lang="nl-NL" dirty="0"/>
+                </a:p>
+              </p:txBody>
+            </p:sp>
+            <p:pic>
+              <p:nvPicPr>
+                <p:cNvPr id="18" name="Picture 3">
+                  <a:extLst>
+                    <a:ext uri="{FF2B5EF4-FFF2-40B4-BE49-F238E27FC236}">
+                      <a16:creationId xmlns:a16="http://schemas.microsoft.com/office/drawing/2014/main" id="{FBE5090E-B5AC-C3F0-69CA-24F0EF24CFCA}"/>
+                    </a:ext>
+                  </a:extLst>
+                </p:cNvPr>
+                <p:cNvPicPr>
+                  <a:picLocks noChangeAspect="1" noChangeArrowheads="1"/>
+                </p:cNvPicPr>
+                <p:nvPr/>
+              </p:nvPicPr>
+              <p:blipFill>
+                <a:blip r:embed="rId4">
+                  <a:clrChange>
+                    <a:clrFrom>
+                      <a:srgbClr val="FFFFFF"/>
+                    </a:clrFrom>
+                    <a:clrTo>
+                      <a:srgbClr val="FFFFFF">
+                        <a:alpha val="0"/>
+                      </a:srgbClr>
+                    </a:clrTo>
+                  </a:clrChange>
+                  <a:extLst>
+                    <a:ext uri="{28A0092B-C50C-407E-A947-70E740481C1C}">
+                      <a14:useLocalDpi xmlns:a14="http://schemas.microsoft.com/office/drawing/2010/main" val="0"/>
+                    </a:ext>
+                  </a:extLst>
+                </a:blip>
+                <a:srcRect/>
+                <a:stretch>
+                  <a:fillRect/>
+                </a:stretch>
+              </p:blipFill>
+              <p:spPr bwMode="auto">
+                <a:xfrm>
+                  <a:off x="1905875" y="1072055"/>
+                  <a:ext cx="1936750" cy="1974850"/>
+                </a:xfrm>
+                <a:prstGeom prst="rect">
+                  <a:avLst/>
+                </a:prstGeom>
+                <a:noFill/>
+                <a:ln>
+                  <a:noFill/>
+                </a:ln>
+                <a:extLst>
+                  <a:ext uri="{909E8E84-426E-40DD-AFC4-6F175D3DCCD1}">
+                    <a14:hiddenFill xmlns:a14="http://schemas.microsoft.com/office/drawing/2010/main">
+                      <a:solidFill>
+                        <a:srgbClr val="FFFFFF"/>
+                      </a:solidFill>
+                    </a14:hiddenFill>
+                  </a:ext>
+                  <a:ext uri="{91240B29-F687-4F45-9708-019B960494DF}">
+                    <a14:hiddenLine xmlns:a14="http://schemas.microsoft.com/office/drawing/2010/main" w="9525">
+                      <a:solidFill>
+                        <a:srgbClr val="000000"/>
+                      </a:solidFill>
+                      <a:miter lim="800000"/>
+                      <a:headEnd/>
+                      <a:tailEnd/>
+                    </a14:hiddenLine>
+                  </a:ext>
+                </a:extLst>
+              </p:spPr>
+            </p:pic>
+          </p:grpSp>
+        </p:grpSp>
+      </p:grpSp>
+    </p:spTree>
+    <p:extLst>
+      <p:ext uri="{BB962C8B-B14F-4D97-AF65-F5344CB8AC3E}">
+        <p14:creationId xmlns:p14="http://schemas.microsoft.com/office/powerpoint/2010/main" val="4226494547"/>
+      </p:ext>
+    </p:extLst>
+  </p:cSld>
+  <p:clrMapOvr>
+    <a:masterClrMapping/>
+  </p:clrMapOvr>
+</p:sld>
+</file>
+
 <file path=ppt/theme/theme1.xml><?xml version="1.0" encoding="utf-8"?>
 <a:theme xmlns:a="http://schemas.openxmlformats.org/drawingml/2006/main" name="Tema di Office">
   <a:themeElements>

</xml_diff>

<commit_message>
10042024 - Mini Simposium update
</commit_message>
<xml_diff>
--- a/2023-2024/Website pic standardization.pptx
+++ b/2023-2024/Website pic standardization.pptx
@@ -10,6 +10,7 @@
     <p:sldId id="258" r:id="rId4"/>
     <p:sldId id="259" r:id="rId5"/>
     <p:sldId id="260" r:id="rId6"/>
+    <p:sldId id="261" r:id="rId7"/>
   </p:sldIdLst>
   <p:sldSz cx="12192000" cy="6858000"/>
   <p:notesSz cx="6858000" cy="9144000"/>
@@ -276,7 +277,7 @@
           <a:p>
             <a:fld id="{AED78EE6-7C35-42AA-BCAB-EACF262A9D8B}" type="datetimeFigureOut">
               <a:rPr lang="nl-NL" smtClean="0"/>
-              <a:t>3-4-2024</a:t>
+              <a:t>10-4-2024</a:t>
             </a:fld>
             <a:endParaRPr lang="nl-NL"/>
           </a:p>
@@ -476,7 +477,7 @@
           <a:p>
             <a:fld id="{AED78EE6-7C35-42AA-BCAB-EACF262A9D8B}" type="datetimeFigureOut">
               <a:rPr lang="nl-NL" smtClean="0"/>
-              <a:t>3-4-2024</a:t>
+              <a:t>10-4-2024</a:t>
             </a:fld>
             <a:endParaRPr lang="nl-NL"/>
           </a:p>
@@ -686,7 +687,7 @@
           <a:p>
             <a:fld id="{AED78EE6-7C35-42AA-BCAB-EACF262A9D8B}" type="datetimeFigureOut">
               <a:rPr lang="nl-NL" smtClean="0"/>
-              <a:t>3-4-2024</a:t>
+              <a:t>10-4-2024</a:t>
             </a:fld>
             <a:endParaRPr lang="nl-NL"/>
           </a:p>
@@ -886,7 +887,7 @@
           <a:p>
             <a:fld id="{AED78EE6-7C35-42AA-BCAB-EACF262A9D8B}" type="datetimeFigureOut">
               <a:rPr lang="nl-NL" smtClean="0"/>
-              <a:t>3-4-2024</a:t>
+              <a:t>10-4-2024</a:t>
             </a:fld>
             <a:endParaRPr lang="nl-NL"/>
           </a:p>
@@ -1162,7 +1163,7 @@
           <a:p>
             <a:fld id="{AED78EE6-7C35-42AA-BCAB-EACF262A9D8B}" type="datetimeFigureOut">
               <a:rPr lang="nl-NL" smtClean="0"/>
-              <a:t>3-4-2024</a:t>
+              <a:t>10-4-2024</a:t>
             </a:fld>
             <a:endParaRPr lang="nl-NL"/>
           </a:p>
@@ -1430,7 +1431,7 @@
           <a:p>
             <a:fld id="{AED78EE6-7C35-42AA-BCAB-EACF262A9D8B}" type="datetimeFigureOut">
               <a:rPr lang="nl-NL" smtClean="0"/>
-              <a:t>3-4-2024</a:t>
+              <a:t>10-4-2024</a:t>
             </a:fld>
             <a:endParaRPr lang="nl-NL"/>
           </a:p>
@@ -1845,7 +1846,7 @@
           <a:p>
             <a:fld id="{AED78EE6-7C35-42AA-BCAB-EACF262A9D8B}" type="datetimeFigureOut">
               <a:rPr lang="nl-NL" smtClean="0"/>
-              <a:t>3-4-2024</a:t>
+              <a:t>10-4-2024</a:t>
             </a:fld>
             <a:endParaRPr lang="nl-NL"/>
           </a:p>
@@ -1987,7 +1988,7 @@
           <a:p>
             <a:fld id="{AED78EE6-7C35-42AA-BCAB-EACF262A9D8B}" type="datetimeFigureOut">
               <a:rPr lang="nl-NL" smtClean="0"/>
-              <a:t>3-4-2024</a:t>
+              <a:t>10-4-2024</a:t>
             </a:fld>
             <a:endParaRPr lang="nl-NL"/>
           </a:p>
@@ -2100,7 +2101,7 @@
           <a:p>
             <a:fld id="{AED78EE6-7C35-42AA-BCAB-EACF262A9D8B}" type="datetimeFigureOut">
               <a:rPr lang="nl-NL" smtClean="0"/>
-              <a:t>3-4-2024</a:t>
+              <a:t>10-4-2024</a:t>
             </a:fld>
             <a:endParaRPr lang="nl-NL"/>
           </a:p>
@@ -2413,7 +2414,7 @@
           <a:p>
             <a:fld id="{AED78EE6-7C35-42AA-BCAB-EACF262A9D8B}" type="datetimeFigureOut">
               <a:rPr lang="nl-NL" smtClean="0"/>
-              <a:t>3-4-2024</a:t>
+              <a:t>10-4-2024</a:t>
             </a:fld>
             <a:endParaRPr lang="nl-NL"/>
           </a:p>
@@ -2702,7 +2703,7 @@
           <a:p>
             <a:fld id="{AED78EE6-7C35-42AA-BCAB-EACF262A9D8B}" type="datetimeFigureOut">
               <a:rPr lang="nl-NL" smtClean="0"/>
-              <a:t>3-4-2024</a:t>
+              <a:t>10-4-2024</a:t>
             </a:fld>
             <a:endParaRPr lang="nl-NL"/>
           </a:p>
@@ -2945,7 +2946,7 @@
           <a:p>
             <a:fld id="{AED78EE6-7C35-42AA-BCAB-EACF262A9D8B}" type="datetimeFigureOut">
               <a:rPr lang="nl-NL" smtClean="0"/>
-              <a:t>3-4-2024</a:t>
+              <a:t>10-4-2024</a:t>
             </a:fld>
             <a:endParaRPr lang="nl-NL"/>
           </a:p>
@@ -5580,6 +5581,313 @@
 </p:sld>
 </file>
 
+<file path=ppt/slides/slide6.xml><?xml version="1.0" encoding="utf-8"?>
+<p:sld xmlns:a="http://schemas.openxmlformats.org/drawingml/2006/main" xmlns:r="http://schemas.openxmlformats.org/officeDocument/2006/relationships" xmlns:p="http://schemas.openxmlformats.org/presentationml/2006/main">
+  <p:cSld>
+    <p:spTree>
+      <p:nvGrpSpPr>
+        <p:cNvPr id="1" name="">
+          <a:extLst>
+            <a:ext uri="{FF2B5EF4-FFF2-40B4-BE49-F238E27FC236}">
+              <a16:creationId xmlns:a16="http://schemas.microsoft.com/office/drawing/2014/main" id="{AE62596F-F9CA-ED4F-8B6D-7B8A22F9204A}"/>
+            </a:ext>
+          </a:extLst>
+        </p:cNvPr>
+        <p:cNvGrpSpPr/>
+        <p:nvPr/>
+      </p:nvGrpSpPr>
+      <p:grpSpPr>
+        <a:xfrm>
+          <a:off x="0" y="0"/>
+          <a:ext cx="0" cy="0"/>
+          <a:chOff x="0" y="0"/>
+          <a:chExt cx="0" cy="0"/>
+        </a:xfrm>
+      </p:grpSpPr>
+      <p:sp>
+        <p:nvSpPr>
+          <p:cNvPr id="7" name="CasellaDiTesto 6">
+            <a:extLst>
+              <a:ext uri="{FF2B5EF4-FFF2-40B4-BE49-F238E27FC236}">
+                <a16:creationId xmlns:a16="http://schemas.microsoft.com/office/drawing/2014/main" id="{EEAB4C77-9780-F4B3-35D2-2CE01D1BE9BC}"/>
+              </a:ext>
+            </a:extLst>
+          </p:cNvPr>
+          <p:cNvSpPr txBox="1"/>
+          <p:nvPr/>
+        </p:nvSpPr>
+        <p:spPr>
+          <a:xfrm>
+            <a:off x="4880610" y="287856"/>
+            <a:ext cx="2430780" cy="369332"/>
+          </a:xfrm>
+          <a:prstGeom prst="rect">
+            <a:avLst/>
+          </a:prstGeom>
+          <a:noFill/>
+        </p:spPr>
+        <p:txBody>
+          <a:bodyPr wrap="square" rtlCol="0">
+            <a:spAutoFit/>
+          </a:bodyPr>
+          <a:lstStyle/>
+          <a:p>
+            <a:pPr algn="ctr"/>
+            <a:r>
+              <a:rPr lang="nl-NL" dirty="0"/>
+              <a:t>20240411_Bilge</a:t>
+            </a:r>
+          </a:p>
+        </p:txBody>
+      </p:sp>
+      <p:sp>
+        <p:nvSpPr>
+          <p:cNvPr id="13" name="CasellaDiTesto 12">
+            <a:extLst>
+              <a:ext uri="{FF2B5EF4-FFF2-40B4-BE49-F238E27FC236}">
+                <a16:creationId xmlns:a16="http://schemas.microsoft.com/office/drawing/2014/main" id="{76A34A7A-6865-E6D1-B2B1-E4DEF04215F7}"/>
+              </a:ext>
+            </a:extLst>
+          </p:cNvPr>
+          <p:cNvSpPr txBox="1"/>
+          <p:nvPr/>
+        </p:nvSpPr>
+        <p:spPr>
+          <a:xfrm>
+            <a:off x="3183600" y="4372011"/>
+            <a:ext cx="5824800" cy="461665"/>
+          </a:xfrm>
+          <a:prstGeom prst="rect">
+            <a:avLst/>
+          </a:prstGeom>
+          <a:noFill/>
+        </p:spPr>
+        <p:txBody>
+          <a:bodyPr wrap="square" rtlCol="0">
+            <a:spAutoFit/>
+          </a:bodyPr>
+          <a:lstStyle/>
+          <a:p>
+            <a:r>
+              <a:rPr lang="en-US" sz="1200" b="1" dirty="0"/>
+              <a:t>Adaptive Transportation and Logistics through Operations Research, Behavioral Modeling and Machine Learning </a:t>
+            </a:r>
+            <a:r>
+              <a:rPr lang="nl-NL" sz="1200" b="1" dirty="0"/>
+              <a:t>– </a:t>
+            </a:r>
+            <a:r>
+              <a:rPr lang="nl-NL" sz="1200" b="1" dirty="0" err="1"/>
+              <a:t>Bilge</a:t>
+            </a:r>
+            <a:r>
+              <a:rPr lang="nl-NL" sz="1200" b="1" dirty="0"/>
+              <a:t> </a:t>
+            </a:r>
+            <a:r>
+              <a:rPr lang="nl-NL" sz="1200" b="1" dirty="0" err="1"/>
+              <a:t>Atasoy</a:t>
+            </a:r>
+            <a:endParaRPr lang="nl-NL" sz="1200" b="1" dirty="0"/>
+          </a:p>
+        </p:txBody>
+      </p:sp>
+      <p:sp>
+        <p:nvSpPr>
+          <p:cNvPr id="17" name="CasellaDiTesto 16">
+            <a:extLst>
+              <a:ext uri="{FF2B5EF4-FFF2-40B4-BE49-F238E27FC236}">
+                <a16:creationId xmlns:a16="http://schemas.microsoft.com/office/drawing/2014/main" id="{F2E2FF79-459A-6D78-CE44-A138B27BA6AD}"/>
+              </a:ext>
+            </a:extLst>
+          </p:cNvPr>
+          <p:cNvSpPr txBox="1"/>
+          <p:nvPr/>
+        </p:nvSpPr>
+        <p:spPr>
+          <a:xfrm>
+            <a:off x="3183600" y="4835899"/>
+            <a:ext cx="5824800" cy="923330"/>
+          </a:xfrm>
+          <a:prstGeom prst="rect">
+            <a:avLst/>
+          </a:prstGeom>
+          <a:noFill/>
+        </p:spPr>
+        <p:txBody>
+          <a:bodyPr wrap="square" rtlCol="0">
+            <a:spAutoFit/>
+          </a:bodyPr>
+          <a:lstStyle/>
+          <a:p>
+            <a:pPr algn="just"/>
+            <a:r>
+              <a:rPr lang="en-US" sz="900" dirty="0">
+                <a:effectLst/>
+                <a:latin typeface="Calibri" panose="020F0502020204030204" pitchFamily="34" charset="0"/>
+                <a:ea typeface="Times New Roman" panose="02020603050405020304" pitchFamily="18" charset="0"/>
+                <a:cs typeface="Arial" panose="020B0604020202020204" pitchFamily="34" charset="0"/>
+              </a:rPr>
+              <a:t>Operations Research, Behavioral Modeling and Machine Learning need to work hand in hand to reach adaptive transport systems. The intersection between these methodologies enable to have (1) a predictive decision making towards robustness (2) a user-centric nature for better incorporation of preferences (3) an adaptive system that continuously evolve towards better decisions and better representation of user behavior. In this talk I will provide examples across different applications from last-mile deliveries to intermodal transport. </a:t>
+            </a:r>
+          </a:p>
+          <a:p>
+            <a:pPr algn="just"/>
+            <a:endParaRPr lang="en-US" sz="900" dirty="0">
+              <a:effectLst/>
+              <a:latin typeface="Calibri" panose="020F0502020204030204" pitchFamily="34" charset="0"/>
+              <a:ea typeface="Times New Roman" panose="02020603050405020304" pitchFamily="18" charset="0"/>
+              <a:cs typeface="Arial" panose="020B0604020202020204" pitchFamily="34" charset="0"/>
+            </a:endParaRPr>
+          </a:p>
+        </p:txBody>
+      </p:sp>
+      <p:grpSp>
+        <p:nvGrpSpPr>
+          <p:cNvPr id="4" name="Gruppo 3">
+            <a:extLst>
+              <a:ext uri="{FF2B5EF4-FFF2-40B4-BE49-F238E27FC236}">
+                <a16:creationId xmlns:a16="http://schemas.microsoft.com/office/drawing/2014/main" id="{C61E8E20-C947-48E0-F821-781C6BBABC03}"/>
+              </a:ext>
+            </a:extLst>
+          </p:cNvPr>
+          <p:cNvGrpSpPr/>
+          <p:nvPr/>
+        </p:nvGrpSpPr>
+        <p:grpSpPr>
+          <a:xfrm>
+            <a:off x="3183600" y="647722"/>
+            <a:ext cx="5824800" cy="3600000"/>
+            <a:chOff x="5833728" y="2757451"/>
+            <a:chExt cx="5824800" cy="3600000"/>
+          </a:xfrm>
+        </p:grpSpPr>
+        <p:sp>
+          <p:nvSpPr>
+            <p:cNvPr id="5" name="Rettangolo 4">
+              <a:extLst>
+                <a:ext uri="{FF2B5EF4-FFF2-40B4-BE49-F238E27FC236}">
+                  <a16:creationId xmlns:a16="http://schemas.microsoft.com/office/drawing/2014/main" id="{82F53D27-502E-DC48-AC73-823617B9B18F}"/>
+                </a:ext>
+              </a:extLst>
+            </p:cNvPr>
+            <p:cNvSpPr/>
+            <p:nvPr/>
+          </p:nvSpPr>
+          <p:spPr>
+            <a:xfrm>
+              <a:off x="5833728" y="2757451"/>
+              <a:ext cx="5824800" cy="3600000"/>
+            </a:xfrm>
+            <a:prstGeom prst="rect">
+              <a:avLst/>
+            </a:prstGeom>
+            <a:solidFill>
+              <a:schemeClr val="bg1"/>
+            </a:solidFill>
+            <a:ln w="9525">
+              <a:noFill/>
+            </a:ln>
+          </p:spPr>
+          <p:style>
+            <a:lnRef idx="2">
+              <a:schemeClr val="accent1">
+                <a:shade val="15000"/>
+              </a:schemeClr>
+            </a:lnRef>
+            <a:fillRef idx="1">
+              <a:schemeClr val="accent1"/>
+            </a:fillRef>
+            <a:effectRef idx="0">
+              <a:schemeClr val="accent1"/>
+            </a:effectRef>
+            <a:fontRef idx="minor">
+              <a:schemeClr val="lt1"/>
+            </a:fontRef>
+          </p:style>
+          <p:txBody>
+            <a:bodyPr rtlCol="0" anchor="ctr"/>
+            <a:lstStyle/>
+            <a:p>
+              <a:pPr algn="ctr"/>
+              <a:endParaRPr lang="nl-NL" dirty="0"/>
+            </a:p>
+          </p:txBody>
+        </p:sp>
+        <p:pic>
+          <p:nvPicPr>
+            <p:cNvPr id="6" name="Picture 2">
+              <a:extLst>
+                <a:ext uri="{FF2B5EF4-FFF2-40B4-BE49-F238E27FC236}">
+                  <a16:creationId xmlns:a16="http://schemas.microsoft.com/office/drawing/2014/main" id="{8D1E6A67-6907-EE02-4466-BD25EBD963F0}"/>
+                </a:ext>
+              </a:extLst>
+            </p:cNvPr>
+            <p:cNvPicPr>
+              <a:picLocks noChangeAspect="1" noChangeArrowheads="1"/>
+            </p:cNvPicPr>
+            <p:nvPr/>
+          </p:nvPicPr>
+          <p:blipFill>
+            <a:blip r:embed="rId2">
+              <a:extLst>
+                <a:ext uri="{28A0092B-C50C-407E-A947-70E740481C1C}">
+                  <a14:useLocalDpi xmlns:a14="http://schemas.microsoft.com/office/drawing/2010/main" val="0"/>
+                </a:ext>
+              </a:extLst>
+            </a:blip>
+            <a:srcRect/>
+            <a:stretch>
+              <a:fillRect/>
+            </a:stretch>
+          </p:blipFill>
+          <p:spPr bwMode="auto">
+            <a:xfrm>
+              <a:off x="5833728" y="2887371"/>
+              <a:ext cx="5824800" cy="3340159"/>
+            </a:xfrm>
+            <a:prstGeom prst="rect">
+              <a:avLst/>
+            </a:prstGeom>
+            <a:noFill/>
+            <a:ln>
+              <a:noFill/>
+            </a:ln>
+            <a:extLst>
+              <a:ext uri="{909E8E84-426E-40DD-AFC4-6F175D3DCCD1}">
+                <a14:hiddenFill xmlns:a14="http://schemas.microsoft.com/office/drawing/2010/main">
+                  <a:solidFill>
+                    <a:srgbClr val="FFFFFF"/>
+                  </a:solidFill>
+                </a14:hiddenFill>
+              </a:ext>
+              <a:ext uri="{91240B29-F687-4F45-9708-019B960494DF}">
+                <a14:hiddenLine xmlns:a14="http://schemas.microsoft.com/office/drawing/2010/main" w="9525">
+                  <a:solidFill>
+                    <a:srgbClr val="000000"/>
+                  </a:solidFill>
+                  <a:miter lim="800000"/>
+                  <a:headEnd/>
+                  <a:tailEnd/>
+                </a14:hiddenLine>
+              </a:ext>
+            </a:extLst>
+          </p:spPr>
+        </p:pic>
+      </p:grpSp>
+    </p:spTree>
+    <p:extLst>
+      <p:ext uri="{BB962C8B-B14F-4D97-AF65-F5344CB8AC3E}">
+        <p14:creationId xmlns:p14="http://schemas.microsoft.com/office/powerpoint/2010/main" val="3732244909"/>
+      </p:ext>
+    </p:extLst>
+  </p:cSld>
+  <p:clrMapOvr>
+    <a:masterClrMapping/>
+  </p:clrMapOvr>
+</p:sld>
+</file>
+
 <file path=ppt/theme/theme1.xml><?xml version="1.0" encoding="utf-8"?>
 <a:theme xmlns:a="http://schemas.openxmlformats.org/drawingml/2006/main" name="Tema di Office">
   <a:themeElements>

</xml_diff>